<commit_message>
Atualização dos documentos e atualização do site pelo Vinicius
</commit_message>
<xml_diff>
--- a/Documentos/Segunda apresentação TIS .pptx
+++ b/Documentos/Segunda apresentação TIS .pptx
@@ -9,11 +9,10 @@
     <p:sldId id="260" r:id="rId3"/>
     <p:sldId id="259" r:id="rId4"/>
     <p:sldId id="261" r:id="rId5"/>
-    <p:sldId id="263" r:id="rId6"/>
+    <p:sldId id="267" r:id="rId6"/>
     <p:sldId id="257" r:id="rId7"/>
-    <p:sldId id="264" r:id="rId8"/>
-    <p:sldId id="265" r:id="rId9"/>
-    <p:sldId id="266" r:id="rId10"/>
+    <p:sldId id="269" r:id="rId8"/>
+    <p:sldId id="270" r:id="rId9"/>
   </p:sldIdLst>
   <p:sldSz cx="12192000" cy="6858000"/>
   <p:notesSz cx="6858000" cy="9144000"/>
@@ -314,7 +313,7 @@
           <a:p>
             <a:fld id="{8D1AEE31-339B-44A9-A7BD-F2F0D9FD17BF}" type="datetimeFigureOut">
               <a:rPr lang="pt-BR" smtClean="0"/>
-              <a:t>18/10/2016</a:t>
+              <a:t>19/10/2016</a:t>
             </a:fld>
             <a:endParaRPr lang="pt-BR"/>
           </a:p>
@@ -589,7 +588,7 @@
           <a:p>
             <a:fld id="{8D1AEE31-339B-44A9-A7BD-F2F0D9FD17BF}" type="datetimeFigureOut">
               <a:rPr lang="pt-BR" smtClean="0"/>
-              <a:t>18/10/2016</a:t>
+              <a:t>19/10/2016</a:t>
             </a:fld>
             <a:endParaRPr lang="pt-BR"/>
           </a:p>
@@ -783,7 +782,7 @@
           <a:p>
             <a:fld id="{8D1AEE31-339B-44A9-A7BD-F2F0D9FD17BF}" type="datetimeFigureOut">
               <a:rPr lang="pt-BR" smtClean="0"/>
-              <a:t>18/10/2016</a:t>
+              <a:t>19/10/2016</a:t>
             </a:fld>
             <a:endParaRPr lang="pt-BR"/>
           </a:p>
@@ -1051,7 +1050,7 @@
           <a:p>
             <a:fld id="{8D1AEE31-339B-44A9-A7BD-F2F0D9FD17BF}" type="datetimeFigureOut">
               <a:rPr lang="pt-BR" smtClean="0"/>
-              <a:t>18/10/2016</a:t>
+              <a:t>19/10/2016</a:t>
             </a:fld>
             <a:endParaRPr lang="pt-BR"/>
           </a:p>
@@ -1383,7 +1382,7 @@
           <a:p>
             <a:fld id="{8D1AEE31-339B-44A9-A7BD-F2F0D9FD17BF}" type="datetimeFigureOut">
               <a:rPr lang="pt-BR" smtClean="0"/>
-              <a:t>18/10/2016</a:t>
+              <a:t>19/10/2016</a:t>
             </a:fld>
             <a:endParaRPr lang="pt-BR"/>
           </a:p>
@@ -1993,7 +1992,7 @@
           <a:p>
             <a:fld id="{8D1AEE31-339B-44A9-A7BD-F2F0D9FD17BF}" type="datetimeFigureOut">
               <a:rPr lang="pt-BR" smtClean="0"/>
-              <a:t>18/10/2016</a:t>
+              <a:t>19/10/2016</a:t>
             </a:fld>
             <a:endParaRPr lang="pt-BR"/>
           </a:p>
@@ -2840,7 +2839,7 @@
           <a:p>
             <a:fld id="{8D1AEE31-339B-44A9-A7BD-F2F0D9FD17BF}" type="datetimeFigureOut">
               <a:rPr lang="pt-BR" smtClean="0"/>
-              <a:t>18/10/2016</a:t>
+              <a:t>19/10/2016</a:t>
             </a:fld>
             <a:endParaRPr lang="pt-BR"/>
           </a:p>
@@ -3010,7 +3009,7 @@
           <a:p>
             <a:fld id="{8D1AEE31-339B-44A9-A7BD-F2F0D9FD17BF}" type="datetimeFigureOut">
               <a:rPr lang="pt-BR" smtClean="0"/>
-              <a:t>18/10/2016</a:t>
+              <a:t>19/10/2016</a:t>
             </a:fld>
             <a:endParaRPr lang="pt-BR"/>
           </a:p>
@@ -3190,7 +3189,7 @@
           <a:p>
             <a:fld id="{8D1AEE31-339B-44A9-A7BD-F2F0D9FD17BF}" type="datetimeFigureOut">
               <a:rPr lang="pt-BR" smtClean="0"/>
-              <a:t>18/10/2016</a:t>
+              <a:t>19/10/2016</a:t>
             </a:fld>
             <a:endParaRPr lang="pt-BR"/>
           </a:p>
@@ -3360,7 +3359,7 @@
           <a:p>
             <a:fld id="{8D1AEE31-339B-44A9-A7BD-F2F0D9FD17BF}" type="datetimeFigureOut">
               <a:rPr lang="pt-BR" smtClean="0"/>
-              <a:t>18/10/2016</a:t>
+              <a:t>19/10/2016</a:t>
             </a:fld>
             <a:endParaRPr lang="pt-BR"/>
           </a:p>
@@ -3604,7 +3603,7 @@
           <a:p>
             <a:fld id="{8D1AEE31-339B-44A9-A7BD-F2F0D9FD17BF}" type="datetimeFigureOut">
               <a:rPr lang="pt-BR" smtClean="0"/>
-              <a:t>18/10/2016</a:t>
+              <a:t>19/10/2016</a:t>
             </a:fld>
             <a:endParaRPr lang="pt-BR"/>
           </a:p>
@@ -3896,7 +3895,7 @@
           <a:p>
             <a:fld id="{8D1AEE31-339B-44A9-A7BD-F2F0D9FD17BF}" type="datetimeFigureOut">
               <a:rPr lang="pt-BR" smtClean="0"/>
-              <a:t>18/10/2016</a:t>
+              <a:t>19/10/2016</a:t>
             </a:fld>
             <a:endParaRPr lang="pt-BR"/>
           </a:p>
@@ -4334,7 +4333,7 @@
           <a:p>
             <a:fld id="{8D1AEE31-339B-44A9-A7BD-F2F0D9FD17BF}" type="datetimeFigureOut">
               <a:rPr lang="pt-BR" smtClean="0"/>
-              <a:t>18/10/2016</a:t>
+              <a:t>19/10/2016</a:t>
             </a:fld>
             <a:endParaRPr lang="pt-BR"/>
           </a:p>
@@ -4452,7 +4451,7 @@
           <a:p>
             <a:fld id="{8D1AEE31-339B-44A9-A7BD-F2F0D9FD17BF}" type="datetimeFigureOut">
               <a:rPr lang="pt-BR" smtClean="0"/>
-              <a:t>18/10/2016</a:t>
+              <a:t>19/10/2016</a:t>
             </a:fld>
             <a:endParaRPr lang="pt-BR"/>
           </a:p>
@@ -4547,7 +4546,7 @@
           <a:p>
             <a:fld id="{8D1AEE31-339B-44A9-A7BD-F2F0D9FD17BF}" type="datetimeFigureOut">
               <a:rPr lang="pt-BR" smtClean="0"/>
-              <a:t>18/10/2016</a:t>
+              <a:t>19/10/2016</a:t>
             </a:fld>
             <a:endParaRPr lang="pt-BR"/>
           </a:p>
@@ -4826,7 +4825,7 @@
           <a:p>
             <a:fld id="{8D1AEE31-339B-44A9-A7BD-F2F0D9FD17BF}" type="datetimeFigureOut">
               <a:rPr lang="pt-BR" smtClean="0"/>
-              <a:t>18/10/2016</a:t>
+              <a:t>19/10/2016</a:t>
             </a:fld>
             <a:endParaRPr lang="pt-BR"/>
           </a:p>
@@ -5101,7 +5100,7 @@
           <a:p>
             <a:fld id="{8D1AEE31-339B-44A9-A7BD-F2F0D9FD17BF}" type="datetimeFigureOut">
               <a:rPr lang="pt-BR" smtClean="0"/>
-              <a:t>18/10/2016</a:t>
+              <a:t>19/10/2016</a:t>
             </a:fld>
             <a:endParaRPr lang="pt-BR"/>
           </a:p>
@@ -5530,7 +5529,7 @@
           <a:p>
             <a:fld id="{8D1AEE31-339B-44A9-A7BD-F2F0D9FD17BF}" type="datetimeFigureOut">
               <a:rPr lang="pt-BR" smtClean="0"/>
-              <a:t>18/10/2016</a:t>
+              <a:t>19/10/2016</a:t>
             </a:fld>
             <a:endParaRPr lang="pt-BR"/>
           </a:p>
@@ -6421,10 +6420,15 @@
             </a:endParaRPr>
           </a:p>
           <a:p>
-            <a:pPr>
-              <a:buFont typeface="Wingdings" panose="05000000000000000000" pitchFamily="2" charset="2"/>
-              <a:buChar char="Ø"/>
+            <a:pPr marL="0" indent="0">
+              <a:buNone/>
             </a:pPr>
+            <a:br>
+              <a:rPr lang="pt-BR" sz="1600" dirty="0">
+                <a:latin typeface="Arial" panose="020B0604020202020204" pitchFamily="34" charset="0"/>
+                <a:cs typeface="Arial" panose="020B0604020202020204" pitchFamily="34" charset="0"/>
+              </a:rPr>
+            </a:br>
             <a:endParaRPr lang="pt-BR" sz="1600" dirty="0">
               <a:latin typeface="Arial" panose="020B0604020202020204" pitchFamily="34" charset="0"/>
               <a:cs typeface="Arial" panose="020B0604020202020204" pitchFamily="34" charset="0"/>
@@ -6436,7 +6440,7 @@
               <a:buChar char="Ø"/>
             </a:pPr>
             <a:r>
-              <a:rPr lang="pt-BR" sz="1800" b="1" dirty="0">
+              <a:rPr lang="pt-BR" sz="1600" b="1" dirty="0">
                 <a:latin typeface="Arial" panose="020B0604020202020204" pitchFamily="34" charset="0"/>
                 <a:cs typeface="Arial" panose="020B0604020202020204" pitchFamily="34" charset="0"/>
               </a:rPr>
@@ -6448,7 +6452,7 @@
               <a:buFont typeface="Wingdings" panose="05000000000000000000" pitchFamily="2" charset="2"/>
               <a:buChar char="Ø"/>
             </a:pPr>
-            <a:endParaRPr lang="pt-BR" b="1" dirty="0">
+            <a:endParaRPr lang="pt-BR" sz="1600" b="1" dirty="0">
               <a:latin typeface="Arial" panose="020B0604020202020204" pitchFamily="34" charset="0"/>
               <a:cs typeface="Arial" panose="020B0604020202020204" pitchFamily="34" charset="0"/>
             </a:endParaRPr>
@@ -6459,7 +6463,7 @@
               <a:buChar char="Ø"/>
             </a:pPr>
             <a:r>
-              <a:rPr lang="pt-BR" sz="1800" b="1" dirty="0">
+              <a:rPr lang="pt-BR" sz="1600" b="1" dirty="0">
                 <a:latin typeface="Arial" panose="020B0604020202020204" pitchFamily="34" charset="0"/>
                 <a:cs typeface="Arial" panose="020B0604020202020204" pitchFamily="34" charset="0"/>
               </a:rPr>
@@ -6471,7 +6475,7 @@
               <a:buFont typeface="Wingdings" panose="05000000000000000000" pitchFamily="2" charset="2"/>
               <a:buChar char="Ø"/>
             </a:pPr>
-            <a:endParaRPr lang="pt-BR" b="1" dirty="0">
+            <a:endParaRPr lang="pt-BR" sz="1600" b="1" dirty="0">
               <a:latin typeface="Arial" panose="020B0604020202020204" pitchFamily="34" charset="0"/>
               <a:cs typeface="Arial" panose="020B0604020202020204" pitchFamily="34" charset="0"/>
             </a:endParaRPr>
@@ -6482,7 +6486,7 @@
               <a:buChar char="Ø"/>
             </a:pPr>
             <a:r>
-              <a:rPr lang="pt-BR" sz="1800" b="1" dirty="0">
+              <a:rPr lang="pt-BR" sz="1600" b="1" dirty="0">
                 <a:latin typeface="Arial" panose="020B0604020202020204" pitchFamily="34" charset="0"/>
                 <a:cs typeface="Arial" panose="020B0604020202020204" pitchFamily="34" charset="0"/>
               </a:rPr>
@@ -6494,7 +6498,7 @@
               <a:buFont typeface="Wingdings" panose="05000000000000000000" pitchFamily="2" charset="2"/>
               <a:buChar char="Ø"/>
             </a:pPr>
-            <a:endParaRPr lang="pt-BR" b="1" dirty="0">
+            <a:endParaRPr lang="pt-BR" sz="1600" b="1" dirty="0">
               <a:latin typeface="Arial" panose="020B0604020202020204" pitchFamily="34" charset="0"/>
               <a:cs typeface="Arial" panose="020B0604020202020204" pitchFamily="34" charset="0"/>
             </a:endParaRPr>
@@ -6505,7 +6509,7 @@
               <a:buChar char="Ø"/>
             </a:pPr>
             <a:r>
-              <a:rPr lang="pt-BR" sz="1800" b="1" dirty="0">
+              <a:rPr lang="pt-BR" sz="1600" b="1" dirty="0">
                 <a:latin typeface="Arial" panose="020B0604020202020204" pitchFamily="34" charset="0"/>
                 <a:cs typeface="Arial" panose="020B0604020202020204" pitchFamily="34" charset="0"/>
               </a:rPr>
@@ -6834,13 +6838,13 @@
             <p:ph idx="1"/>
             <p:extLst>
               <p:ext uri="{D42A27DB-BD31-4B8C-83A1-F6EECF244321}">
-                <p14:modId xmlns:p14="http://schemas.microsoft.com/office/powerpoint/2010/main" val="830563510"/>
+                <p14:modId xmlns:p14="http://schemas.microsoft.com/office/powerpoint/2010/main" val="4007574816"/>
               </p:ext>
             </p:extLst>
           </p:nvPr>
         </p:nvGraphicFramePr>
         <p:xfrm>
-          <a:off x="2525485" y="2201589"/>
+          <a:off x="2843537" y="2241346"/>
           <a:ext cx="6502402" cy="3127732"/>
         </p:xfrm>
         <a:graphic>
@@ -9234,7 +9238,7 @@
         </p:nvSpPr>
         <p:spPr>
           <a:xfrm>
-            <a:off x="3650342" y="653142"/>
+            <a:off x="3690098" y="600133"/>
             <a:ext cx="4542971" cy="369332"/>
           </a:xfrm>
           <a:prstGeom prst="rect">
@@ -9253,7 +9257,7 @@
                 <a:latin typeface="Arial" panose="020B0604020202020204" pitchFamily="34" charset="0"/>
                 <a:cs typeface="Arial" panose="020B0604020202020204" pitchFamily="34" charset="0"/>
               </a:rPr>
-              <a:t>História de usuário escolhida</a:t>
+              <a:t>HISTÓRIA DE USUÁRIO ESCOLHIDA </a:t>
             </a:r>
           </a:p>
         </p:txBody>
@@ -9298,24 +9302,23 @@
             <p:ph type="title"/>
           </p:nvPr>
         </p:nvSpPr>
-        <p:spPr/>
+        <p:spPr>
+          <a:xfrm>
+            <a:off x="4651513" y="532231"/>
+            <a:ext cx="2232051" cy="739978"/>
+          </a:xfrm>
+        </p:spPr>
         <p:txBody>
           <a:bodyPr/>
           <a:lstStyle/>
           <a:p>
             <a:pPr algn="ctr"/>
-            <a:br>
+            <a:r>
               <a:rPr lang="pt-BR" sz="2000" b="1" dirty="0">
                 <a:latin typeface="Arial" panose="020B0604020202020204" pitchFamily="34" charset="0"/>
                 <a:cs typeface="Arial" panose="020B0604020202020204" pitchFamily="34" charset="0"/>
               </a:rPr>
-            </a:br>
-            <a:r>
-              <a:rPr lang="pt-BR" sz="2000" b="1" dirty="0">
-                <a:latin typeface="Arial" panose="020B0604020202020204" pitchFamily="34" charset="0"/>
-                <a:cs typeface="Arial" panose="020B0604020202020204" pitchFamily="34" charset="0"/>
-              </a:rPr>
-              <a:t>Restrições</a:t>
+              <a:t>RESTRIÇÕES</a:t>
             </a:r>
             <a:br>
               <a:rPr lang="pt-BR" sz="4400" b="1" dirty="0">
@@ -9337,28 +9340,108 @@
             <p:ph idx="1"/>
           </p:nvPr>
         </p:nvSpPr>
-        <p:spPr/>
+        <p:spPr>
+          <a:xfrm>
+            <a:off x="2865853" y="1959266"/>
+            <a:ext cx="6569696" cy="4195481"/>
+          </a:xfrm>
+        </p:spPr>
         <p:txBody>
           <a:bodyPr>
             <a:normAutofit/>
           </a:bodyPr>
           <a:lstStyle/>
           <a:p>
+            <a:pPr lvl="0"/>
+            <a:endParaRPr lang="pt-BR" sz="1600" dirty="0">
+              <a:latin typeface="Arial" panose="020B0604020202020204" pitchFamily="34" charset="0"/>
+              <a:cs typeface="Arial" panose="020B0604020202020204" pitchFamily="34" charset="0"/>
+            </a:endParaRPr>
+          </a:p>
+          <a:p>
+            <a:pPr lvl="0"/>
             <a:r>
               <a:rPr lang="pt-BR" sz="1600" dirty="0">
                 <a:latin typeface="Arial" panose="020B0604020202020204" pitchFamily="34" charset="0"/>
                 <a:cs typeface="Arial" panose="020B0604020202020204" pitchFamily="34" charset="0"/>
               </a:rPr>
-              <a:t>Plataforma Web;</a:t>
-            </a:r>
-          </a:p>
-          <a:p>
+              <a:t>Plataforma Web, hospedada no servidor da </a:t>
+            </a:r>
+            <a:r>
+              <a:rPr lang="pt-BR" sz="1600" dirty="0" err="1">
+                <a:latin typeface="Arial" panose="020B0604020202020204" pitchFamily="34" charset="0"/>
+                <a:cs typeface="Arial" panose="020B0604020202020204" pitchFamily="34" charset="0"/>
+              </a:rPr>
+              <a:t>Puc</a:t>
+            </a:r>
             <a:r>
               <a:rPr lang="pt-BR" sz="1600" dirty="0">
                 <a:latin typeface="Arial" panose="020B0604020202020204" pitchFamily="34" charset="0"/>
                 <a:cs typeface="Arial" panose="020B0604020202020204" pitchFamily="34" charset="0"/>
               </a:rPr>
-              <a:t>Usuários com pouco conhecimento de tecnologias;</a:t>
+              <a:t>;</a:t>
+            </a:r>
+          </a:p>
+          <a:p>
+            <a:pPr lvl="0"/>
+            <a:endParaRPr lang="pt-BR" sz="1600" dirty="0">
+              <a:latin typeface="Arial" panose="020B0604020202020204" pitchFamily="34" charset="0"/>
+              <a:cs typeface="Arial" panose="020B0604020202020204" pitchFamily="34" charset="0"/>
+            </a:endParaRPr>
+          </a:p>
+          <a:p>
+            <a:pPr lvl="0"/>
+            <a:endParaRPr lang="pt-BR" sz="1600" dirty="0">
+              <a:latin typeface="Arial" panose="020B0604020202020204" pitchFamily="34" charset="0"/>
+              <a:cs typeface="Arial" panose="020B0604020202020204" pitchFamily="34" charset="0"/>
+            </a:endParaRPr>
+          </a:p>
+          <a:p>
+            <a:pPr lvl="0"/>
+            <a:r>
+              <a:rPr lang="pt-BR" sz="1600" dirty="0">
+                <a:latin typeface="Arial" panose="020B0604020202020204" pitchFamily="34" charset="0"/>
+                <a:cs typeface="Arial" panose="020B0604020202020204" pitchFamily="34" charset="0"/>
+              </a:rPr>
+              <a:t>Sigilo dos materiais da Medicina Veterinária;</a:t>
+            </a:r>
+          </a:p>
+          <a:p>
+            <a:pPr lvl="0"/>
+            <a:endParaRPr lang="pt-BR" sz="1600" dirty="0">
+              <a:latin typeface="Arial" panose="020B0604020202020204" pitchFamily="34" charset="0"/>
+              <a:cs typeface="Arial" panose="020B0604020202020204" pitchFamily="34" charset="0"/>
+            </a:endParaRPr>
+          </a:p>
+          <a:p>
+            <a:pPr lvl="0"/>
+            <a:endParaRPr lang="pt-BR" sz="1600" dirty="0">
+              <a:latin typeface="Arial" panose="020B0604020202020204" pitchFamily="34" charset="0"/>
+              <a:cs typeface="Arial" panose="020B0604020202020204" pitchFamily="34" charset="0"/>
+            </a:endParaRPr>
+          </a:p>
+          <a:p>
+            <a:pPr lvl="0"/>
+            <a:r>
+              <a:rPr lang="pt-BR" sz="1600" dirty="0">
+                <a:latin typeface="Arial" panose="020B0604020202020204" pitchFamily="34" charset="0"/>
+                <a:cs typeface="Arial" panose="020B0604020202020204" pitchFamily="34" charset="0"/>
+              </a:rPr>
+              <a:t>Integrantes da equipe devem ser docentes e/ou discentes da </a:t>
+            </a:r>
+            <a:r>
+              <a:rPr lang="pt-BR" sz="1600" dirty="0" err="1">
+                <a:latin typeface="Arial" panose="020B0604020202020204" pitchFamily="34" charset="0"/>
+                <a:cs typeface="Arial" panose="020B0604020202020204" pitchFamily="34" charset="0"/>
+              </a:rPr>
+              <a:t>Puc</a:t>
+            </a:r>
+            <a:r>
+              <a:rPr lang="pt-BR" sz="1600" dirty="0">
+                <a:latin typeface="Arial" panose="020B0604020202020204" pitchFamily="34" charset="0"/>
+                <a:cs typeface="Arial" panose="020B0604020202020204" pitchFamily="34" charset="0"/>
+              </a:rPr>
+              <a:t>.</a:t>
             </a:r>
           </a:p>
           <a:p>
@@ -9409,31 +9492,24 @@
             <p:ph type="title"/>
           </p:nvPr>
         </p:nvSpPr>
-        <p:spPr/>
+        <p:spPr>
+          <a:xfrm>
+            <a:off x="1457739" y="609600"/>
+            <a:ext cx="8203095" cy="609600"/>
+          </a:xfrm>
+        </p:spPr>
         <p:txBody>
           <a:bodyPr/>
           <a:lstStyle/>
           <a:p>
             <a:pPr algn="ctr"/>
-            <a:br>
+            <a:r>
               <a:rPr lang="pt-BR" sz="2000" b="1" dirty="0">
                 <a:latin typeface="Arial" panose="020B0604020202020204" pitchFamily="34" charset="0"/>
                 <a:cs typeface="Arial" panose="020B0604020202020204" pitchFamily="34" charset="0"/>
               </a:rPr>
-            </a:br>
-            <a:r>
-              <a:rPr lang="pt-BR" sz="2000" b="1" dirty="0">
-                <a:latin typeface="Arial" panose="020B0604020202020204" pitchFamily="34" charset="0"/>
-                <a:cs typeface="Arial" panose="020B0604020202020204" pitchFamily="34" charset="0"/>
-              </a:rPr>
-              <a:t>PROJETO SOLUÇÃO</a:t>
-            </a:r>
-            <a:br>
-              <a:rPr lang="pt-BR" sz="4400" b="1" dirty="0">
-                <a:latin typeface="Arial" panose="020B0604020202020204" pitchFamily="34" charset="0"/>
-                <a:cs typeface="Arial" panose="020B0604020202020204" pitchFamily="34" charset="0"/>
-              </a:rPr>
-            </a:br>
+              <a:t>PROJETO SOLUÇÃO – ALGUMAS FERRAMENTAS UTILIZADAS</a:t>
+            </a:r>
             <a:endParaRPr lang="pt-BR" dirty="0"/>
           </a:p>
         </p:txBody>
@@ -9448,39 +9524,38 @@
             <p:ph idx="1"/>
           </p:nvPr>
         </p:nvSpPr>
-        <p:spPr/>
+        <p:spPr>
+          <a:xfrm>
+            <a:off x="2388773" y="1985770"/>
+            <a:ext cx="7272061" cy="4195481"/>
+          </a:xfrm>
+        </p:spPr>
         <p:txBody>
           <a:bodyPr>
             <a:normAutofit/>
           </a:bodyPr>
           <a:lstStyle/>
           <a:p>
+            <a:pPr lvl="0"/>
             <a:endParaRPr lang="pt-BR" sz="1600" dirty="0">
               <a:latin typeface="Arial" panose="020B0604020202020204" pitchFamily="34" charset="0"/>
               <a:cs typeface="Arial" panose="020B0604020202020204" pitchFamily="34" charset="0"/>
             </a:endParaRPr>
           </a:p>
           <a:p>
+            <a:r>
+              <a:rPr lang="pt-BR" sz="1600" dirty="0">
+                <a:latin typeface="Arial" panose="020B0604020202020204" pitchFamily="34" charset="0"/>
+                <a:cs typeface="Arial" panose="020B0604020202020204" pitchFamily="34" charset="0"/>
+              </a:rPr>
+              <a:t>NOTEPAD++: Edição de códigos;</a:t>
+            </a:r>
+          </a:p>
+          <a:p>
             <a:endParaRPr lang="pt-BR" sz="1600" dirty="0">
               <a:latin typeface="Arial" panose="020B0604020202020204" pitchFamily="34" charset="0"/>
               <a:cs typeface="Arial" panose="020B0604020202020204" pitchFamily="34" charset="0"/>
             </a:endParaRPr>
-          </a:p>
-          <a:p>
-            <a:r>
-              <a:rPr lang="pt-BR" sz="1600" dirty="0" err="1">
-                <a:latin typeface="Arial" panose="020B0604020202020204" pitchFamily="34" charset="0"/>
-                <a:cs typeface="Arial" panose="020B0604020202020204" pitchFamily="34" charset="0"/>
-              </a:rPr>
-              <a:t>Notepad</a:t>
-            </a:r>
-            <a:r>
-              <a:rPr lang="pt-BR" sz="1600" dirty="0">
-                <a:latin typeface="Arial" panose="020B0604020202020204" pitchFamily="34" charset="0"/>
-                <a:cs typeface="Arial" panose="020B0604020202020204" pitchFamily="34" charset="0"/>
-              </a:rPr>
-              <a:t>++:  Edição de códigos;</a:t>
-            </a:r>
           </a:p>
           <a:p>
             <a:r>
@@ -9492,6 +9567,12 @@
             </a:r>
           </a:p>
           <a:p>
+            <a:endParaRPr lang="pt-BR" sz="1600" dirty="0">
+              <a:latin typeface="Arial" panose="020B0604020202020204" pitchFamily="34" charset="0"/>
+              <a:cs typeface="Arial" panose="020B0604020202020204" pitchFamily="34" charset="0"/>
+            </a:endParaRPr>
+          </a:p>
+          <a:p>
             <a:r>
               <a:rPr lang="pt-BR" sz="1600" dirty="0">
                 <a:latin typeface="Arial" panose="020B0604020202020204" pitchFamily="34" charset="0"/>
@@ -9501,6 +9582,12 @@
             </a:r>
           </a:p>
           <a:p>
+            <a:endParaRPr lang="pt-BR" sz="1600" dirty="0">
+              <a:latin typeface="Arial" panose="020B0604020202020204" pitchFamily="34" charset="0"/>
+              <a:cs typeface="Arial" panose="020B0604020202020204" pitchFamily="34" charset="0"/>
+            </a:endParaRPr>
+          </a:p>
+          <a:p>
             <a:r>
               <a:rPr lang="pt-BR" sz="1600" dirty="0">
                 <a:latin typeface="Arial" panose="020B0604020202020204" pitchFamily="34" charset="0"/>
@@ -9510,6 +9597,12 @@
             </a:r>
           </a:p>
           <a:p>
+            <a:endParaRPr lang="pt-BR" sz="1600" dirty="0">
+              <a:latin typeface="Arial" panose="020B0604020202020204" pitchFamily="34" charset="0"/>
+              <a:cs typeface="Arial" panose="020B0604020202020204" pitchFamily="34" charset="0"/>
+            </a:endParaRPr>
+          </a:p>
+          <a:p>
             <a:r>
               <a:rPr lang="pt-BR" sz="1600" dirty="0">
                 <a:latin typeface="Arial" panose="020B0604020202020204" pitchFamily="34" charset="0"/>
@@ -9519,9 +9612,6 @@
             </a:r>
           </a:p>
           <a:p>
-            <a:pPr marL="0" indent="0">
-              <a:buNone/>
-            </a:pPr>
             <a:endParaRPr lang="pt-BR" sz="1600" dirty="0">
               <a:latin typeface="Arial" panose="020B0604020202020204" pitchFamily="34" charset="0"/>
               <a:cs typeface="Arial" panose="020B0604020202020204" pitchFamily="34" charset="0"/>
@@ -9532,7 +9622,7 @@
     </p:spTree>
     <p:extLst>
       <p:ext uri="{BB962C8B-B14F-4D97-AF65-F5344CB8AC3E}">
-        <p14:creationId xmlns:p14="http://schemas.microsoft.com/office/powerpoint/2010/main" val="2067150290"/>
+        <p14:creationId xmlns:p14="http://schemas.microsoft.com/office/powerpoint/2010/main" val="1432853025"/>
       </p:ext>
     </p:extLst>
   </p:cSld>
@@ -10428,18 +10518,24 @@
             <p:ph type="title"/>
           </p:nvPr>
         </p:nvSpPr>
-        <p:spPr/>
+        <p:spPr>
+          <a:xfrm>
+            <a:off x="2786338" y="596348"/>
+            <a:ext cx="6662461" cy="609600"/>
+          </a:xfrm>
+        </p:spPr>
         <p:txBody>
           <a:bodyPr/>
           <a:lstStyle/>
           <a:p>
             <a:pPr algn="ctr"/>
-            <a:br>
+            <a:r>
               <a:rPr lang="pt-BR" sz="2000" b="1" dirty="0">
                 <a:latin typeface="Arial" panose="020B0604020202020204" pitchFamily="34" charset="0"/>
                 <a:cs typeface="Arial" panose="020B0604020202020204" pitchFamily="34" charset="0"/>
               </a:rPr>
-            </a:br>
+              <a:t>METODOLOGIA DO TRABALHO</a:t>
+            </a:r>
             <a:endParaRPr lang="pt-BR" dirty="0"/>
           </a:p>
         </p:txBody>
@@ -10454,24 +10550,45 @@
             <p:ph idx="1"/>
           </p:nvPr>
         </p:nvSpPr>
-        <p:spPr/>
+        <p:spPr>
+          <a:xfrm>
+            <a:off x="2481539" y="1972518"/>
+            <a:ext cx="7272061" cy="4195481"/>
+          </a:xfrm>
+        </p:spPr>
         <p:txBody>
           <a:bodyPr>
             <a:normAutofit/>
           </a:bodyPr>
           <a:lstStyle/>
           <a:p>
+            <a:pPr lvl="0"/>
             <a:endParaRPr lang="pt-BR" sz="1600" dirty="0">
               <a:latin typeface="Arial" panose="020B0604020202020204" pitchFamily="34" charset="0"/>
               <a:cs typeface="Arial" panose="020B0604020202020204" pitchFamily="34" charset="0"/>
             </a:endParaRPr>
           </a:p>
+          <a:p>
+            <a:r>
+              <a:rPr lang="pt-BR" sz="1600" dirty="0">
+                <a:latin typeface="Arial" panose="020B0604020202020204" pitchFamily="34" charset="0"/>
+                <a:cs typeface="Arial" panose="020B0604020202020204" pitchFamily="34" charset="0"/>
+              </a:rPr>
+              <a:t>Será colocado conteúdo posteriormente;.</a:t>
+            </a:r>
+          </a:p>
+          <a:p>
+            <a:endParaRPr lang="pt-BR" sz="1600" dirty="0">
+              <a:latin typeface="Arial" panose="020B0604020202020204" pitchFamily="34" charset="0"/>
+              <a:cs typeface="Arial" panose="020B0604020202020204" pitchFamily="34" charset="0"/>
+            </a:endParaRPr>
+          </a:p>
         </p:txBody>
       </p:sp>
     </p:spTree>
     <p:extLst>
       <p:ext uri="{BB962C8B-B14F-4D97-AF65-F5344CB8AC3E}">
-        <p14:creationId xmlns:p14="http://schemas.microsoft.com/office/powerpoint/2010/main" val="4046878811"/>
+        <p14:creationId xmlns:p14="http://schemas.microsoft.com/office/powerpoint/2010/main" val="3567074100"/>
       </p:ext>
     </p:extLst>
   </p:cSld>
@@ -10508,18 +10625,24 @@
             <p:ph type="title"/>
           </p:nvPr>
         </p:nvSpPr>
-        <p:spPr/>
+        <p:spPr>
+          <a:xfrm>
+            <a:off x="2786338" y="596348"/>
+            <a:ext cx="6662461" cy="609600"/>
+          </a:xfrm>
+        </p:spPr>
         <p:txBody>
           <a:bodyPr/>
           <a:lstStyle/>
           <a:p>
             <a:pPr algn="ctr"/>
-            <a:br>
+            <a:r>
               <a:rPr lang="pt-BR" sz="2000" b="1" dirty="0">
                 <a:latin typeface="Arial" panose="020B0604020202020204" pitchFamily="34" charset="0"/>
                 <a:cs typeface="Arial" panose="020B0604020202020204" pitchFamily="34" charset="0"/>
               </a:rPr>
-            </a:br>
+              <a:t>IMPLEMENTAÇÃO DA SOLUÇÃO</a:t>
+            </a:r>
             <a:endParaRPr lang="pt-BR" dirty="0"/>
           </a:p>
         </p:txBody>
@@ -10534,92 +10657,33 @@
             <p:ph idx="1"/>
           </p:nvPr>
         </p:nvSpPr>
-        <p:spPr/>
+        <p:spPr>
+          <a:xfrm>
+            <a:off x="2481539" y="1972518"/>
+            <a:ext cx="7272061" cy="4195481"/>
+          </a:xfrm>
+        </p:spPr>
         <p:txBody>
           <a:bodyPr>
             <a:normAutofit/>
           </a:bodyPr>
           <a:lstStyle/>
           <a:p>
+            <a:pPr lvl="0"/>
             <a:endParaRPr lang="pt-BR" sz="1600" dirty="0">
               <a:latin typeface="Arial" panose="020B0604020202020204" pitchFamily="34" charset="0"/>
               <a:cs typeface="Arial" panose="020B0604020202020204" pitchFamily="34" charset="0"/>
             </a:endParaRPr>
           </a:p>
-        </p:txBody>
-      </p:sp>
-    </p:spTree>
-    <p:extLst>
-      <p:ext uri="{BB962C8B-B14F-4D97-AF65-F5344CB8AC3E}">
-        <p14:creationId xmlns:p14="http://schemas.microsoft.com/office/powerpoint/2010/main" val="3830970109"/>
-      </p:ext>
-    </p:extLst>
-  </p:cSld>
-  <p:clrMapOvr>
-    <a:masterClrMapping/>
-  </p:clrMapOvr>
-</p:sld>
-</file>
-
-<file path=ppt/slides/slide9.xml><?xml version="1.0" encoding="utf-8"?>
-<p:sld xmlns:a="http://schemas.openxmlformats.org/drawingml/2006/main" xmlns:r="http://schemas.openxmlformats.org/officeDocument/2006/relationships" xmlns:p="http://schemas.openxmlformats.org/presentationml/2006/main">
-  <p:cSld>
-    <p:spTree>
-      <p:nvGrpSpPr>
-        <p:cNvPr id="1" name=""/>
-        <p:cNvGrpSpPr/>
-        <p:nvPr/>
-      </p:nvGrpSpPr>
-      <p:grpSpPr>
-        <a:xfrm>
-          <a:off x="0" y="0"/>
-          <a:ext cx="0" cy="0"/>
-          <a:chOff x="0" y="0"/>
-          <a:chExt cx="0" cy="0"/>
-        </a:xfrm>
-      </p:grpSpPr>
-      <p:sp>
-        <p:nvSpPr>
-          <p:cNvPr id="2" name="Título 1"/>
-          <p:cNvSpPr>
-            <a:spLocks noGrp="1"/>
-          </p:cNvSpPr>
-          <p:nvPr>
-            <p:ph type="title"/>
-          </p:nvPr>
-        </p:nvSpPr>
-        <p:spPr/>
-        <p:txBody>
-          <a:bodyPr/>
-          <a:lstStyle/>
-          <a:p>
-            <a:pPr algn="ctr"/>
-            <a:br>
-              <a:rPr lang="pt-BR" sz="2000" b="1" dirty="0">
+          <a:p>
+            <a:r>
+              <a:rPr lang="pt-BR" sz="1600" dirty="0">
                 <a:latin typeface="Arial" panose="020B0604020202020204" pitchFamily="34" charset="0"/>
                 <a:cs typeface="Arial" panose="020B0604020202020204" pitchFamily="34" charset="0"/>
               </a:rPr>
-            </a:br>
-            <a:endParaRPr lang="pt-BR" dirty="0"/>
-          </a:p>
-        </p:txBody>
-      </p:sp>
-      <p:sp>
-        <p:nvSpPr>
-          <p:cNvPr id="3" name="Espaço Reservado para Conteúdo 2"/>
-          <p:cNvSpPr>
-            <a:spLocks noGrp="1"/>
-          </p:cNvSpPr>
-          <p:nvPr>
-            <p:ph idx="1"/>
-          </p:nvPr>
-        </p:nvSpPr>
-        <p:spPr/>
-        <p:txBody>
-          <a:bodyPr>
-            <a:normAutofit/>
-          </a:bodyPr>
-          <a:lstStyle/>
+              <a:t>Será colocado conteúdo posteriormente;.</a:t>
+            </a:r>
+          </a:p>
           <a:p>
             <a:endParaRPr lang="pt-BR" sz="1600" dirty="0">
               <a:latin typeface="Arial" panose="020B0604020202020204" pitchFamily="34" charset="0"/>
@@ -10631,7 +10695,7 @@
     </p:spTree>
     <p:extLst>
       <p:ext uri="{BB962C8B-B14F-4D97-AF65-F5344CB8AC3E}">
-        <p14:creationId xmlns:p14="http://schemas.microsoft.com/office/powerpoint/2010/main" val="1110450657"/>
+        <p14:creationId xmlns:p14="http://schemas.microsoft.com/office/powerpoint/2010/main" val="1913479333"/>
       </p:ext>
     </p:extLst>
   </p:cSld>

</xml_diff>